<commit_message>
Remove node_modules from repository
</commit_message>
<xml_diff>
--- a/assets/docs/presentation-petits-plats.pptx
+++ b/assets/docs/presentation-petits-plats.pptx
@@ -202,7 +202,7 @@
           <a:p>
             <a:fld id="{A5EB5074-DB72-1144-9F12-611469B8E149}" type="datetimeFigureOut">
               <a:rPr lang="fr-FR" smtClean="0"/>
-              <a:t>23/09/2024</a:t>
+              <a:t>29/09/2024</a:t>
             </a:fld>
             <a:endParaRPr lang="fr-FR"/>
           </a:p>
@@ -4129,7 +4129,7 @@
         <p:spPr>
           <a:xfrm>
             <a:off x="1718837" y="2716917"/>
-            <a:ext cx="8754321" cy="2554545"/>
+            <a:ext cx="8754321" cy="2308324"/>
           </a:xfrm>
           <a:prstGeom prst="rect">
             <a:avLst/>
@@ -4219,7 +4219,7 @@
                 <a:effectLst/>
                 <a:latin typeface="ui-sans-serif"/>
               </a:rPr>
-              <a:t> pour l'interface, et écrire tout le code JavaScript manuellement.</a:t>
+              <a:t> pour l'interface, et écrire tout le code JavaScript sans librairies additionnelles</a:t>
             </a:r>
           </a:p>
           <a:p>
@@ -4232,7 +4232,7 @@
                 <a:effectLst/>
                 <a:latin typeface="ui-sans-serif"/>
               </a:rPr>
-              <a:t> Implémenter deux versions de l'algorithme de recherche (boucles natives et programmation fonctionnelle) et comparer leurs performances.</a:t>
+              <a:t>Implémenter deux versions de l'algorithme de recherche et comparer leurs performances.</a:t>
             </a:r>
           </a:p>
           <a:p>
@@ -4341,13 +4341,13 @@
         </p:nvSpPr>
         <p:spPr>
           <a:xfrm>
-            <a:off x="1046897" y="3429000"/>
+            <a:off x="1046897" y="2919714"/>
             <a:ext cx="10098206" cy="2358342"/>
           </a:xfrm>
         </p:spPr>
         <p:txBody>
           <a:bodyPr>
-            <a:normAutofit fontScale="92500" lnSpcReduction="20000"/>
+            <a:normAutofit fontScale="85000" lnSpcReduction="20000"/>
           </a:bodyPr>
           <a:lstStyle/>
           <a:p>
@@ -4409,6 +4409,16 @@
               <a:rPr lang="fr-FR" sz="1600" dirty="0"/>
               <a:t>)</a:t>
             </a:r>
+          </a:p>
+          <a:p>
+            <a:pPr lvl="1"/>
+            <a:r>
+              <a:rPr lang="fr-FR" sz="1600" dirty="0">
+                <a:hlinkClick r:id="rId2"/>
+              </a:rPr>
+              <a:t>Lien Maquette</a:t>
+            </a:r>
+            <a:endParaRPr lang="fr-FR" sz="1600" dirty="0"/>
           </a:p>
           <a:p>
             <a:pPr marL="457200" lvl="1" indent="0">
@@ -4945,7 +4955,7 @@
             </a:pPr>
             <a:r>
               <a:rPr lang="fr-FR" sz="1800" dirty="0"/>
-              <a:t>Présentation du code avec méthode JS natifs / </a:t>
+              <a:t>Présentation du code avec méthode Boucles JS / </a:t>
             </a:r>
             <a:r>
               <a:rPr lang="fr-FR" sz="1800" dirty="0" err="1"/>

</xml_diff>